<commit_message>
project review documents and powerpoint
</commit_message>
<xml_diff>
--- a/project_management/Project Review.pptx
+++ b/project_management/Project Review.pptx
@@ -235,7 +235,7 @@
           <a:p>
             <a:fld id="{5EA28068-AFBD-4979-B752-9EB6F90B1386}" type="datetimeFigureOut">
               <a:rPr lang="en-US" smtClean="0"/>
-              <a:t>2/2/23</a:t>
+              <a:t>2/3/23</a:t>
             </a:fld>
             <a:endParaRPr lang="en-US" dirty="0"/>
           </a:p>
@@ -11476,7 +11476,58 @@
           <a:bodyPr/>
           <a:lstStyle/>
           <a:p>
-            <a:endParaRPr lang="en-US" dirty="0"/>
+            <a:r>
+              <a:rPr lang="en-US" dirty="0"/>
+              <a:t>Syncing components on the whiteboard</a:t>
+            </a:r>
+          </a:p>
+          <a:p>
+            <a:pPr lvl="1"/>
+            <a:r>
+              <a:rPr lang="en-US" dirty="0"/>
+              <a:t>Plan to use the server as the single source of truth</a:t>
+            </a:r>
+          </a:p>
+          <a:p>
+            <a:r>
+              <a:rPr lang="en-US" dirty="0"/>
+              <a:t>WebSocket data transfer performance</a:t>
+            </a:r>
+          </a:p>
+          <a:p>
+            <a:pPr lvl="1"/>
+            <a:r>
+              <a:rPr lang="en-US" dirty="0"/>
+              <a:t>Must be mindful of data transfer size</a:t>
+            </a:r>
+          </a:p>
+          <a:p>
+            <a:pPr lvl="1"/>
+            <a:r>
+              <a:rPr lang="en-US" dirty="0"/>
+              <a:t>Will use a two-level map and design our own schema for data transfer</a:t>
+            </a:r>
+          </a:p>
+          <a:p>
+            <a:r>
+              <a:rPr lang="en-US" dirty="0"/>
+              <a:t>Client-side editing performance</a:t>
+            </a:r>
+          </a:p>
+          <a:p>
+            <a:pPr lvl="1"/>
+            <a:r>
+              <a:rPr lang="en-US" dirty="0"/>
+              <a:t>Use an alternate data structure (</a:t>
+            </a:r>
+            <a:r>
+              <a:rPr lang="en-US" dirty="0" err="1"/>
+              <a:t>kd</a:t>
+            </a:r>
+            <a:r>
+              <a:rPr lang="en-US" dirty="0"/>
+              <a:t>-trees) to store coordinates of components and their size,</a:t>
+            </a:r>
           </a:p>
         </p:txBody>
       </p:sp>
@@ -12552,12 +12603,12 @@
 </file>
 
 <file path=customXml/item1.xml><?xml version="1.0" encoding="utf-8"?>
-<p:properties xmlns:p="http://schemas.microsoft.com/office/2006/metadata/properties" xmlns:xsi="http://www.w3.org/2001/XMLSchema-instance" xmlns:pc="http://schemas.microsoft.com/office/infopath/2007/PartnerControls">
-  <documentManagement>
-    <Status xmlns="71af3243-3dd4-4a8d-8c0d-dd76da1f02a5">Not started</Status>
-    <MediaServiceKeyPoints xmlns="71af3243-3dd4-4a8d-8c0d-dd76da1f02a5" xsi:nil="true"/>
-  </documentManagement>
-</p:properties>
+<?mso-contentType ?>
+<FormTemplates xmlns="http://schemas.microsoft.com/sharepoint/v3/contenttype/forms">
+  <Display>DocumentLibraryForm</Display>
+  <Edit>DocumentLibraryForm</Edit>
+  <New>DocumentLibraryForm</New>
+</FormTemplates>
 </file>
 
 <file path=customXml/item2.xml><?xml version="1.0" encoding="utf-8"?>
@@ -12782,20 +12833,18 @@
 </file>
 
 <file path=customXml/item3.xml><?xml version="1.0" encoding="utf-8"?>
-<?mso-contentType ?>
-<FormTemplates xmlns="http://schemas.microsoft.com/sharepoint/v3/contenttype/forms">
-  <Display>DocumentLibraryForm</Display>
-  <Edit>DocumentLibraryForm</Edit>
-  <New>DocumentLibraryForm</New>
-</FormTemplates>
+<p:properties xmlns:p="http://schemas.microsoft.com/office/2006/metadata/properties" xmlns:xsi="http://www.w3.org/2001/XMLSchema-instance" xmlns:pc="http://schemas.microsoft.com/office/infopath/2007/PartnerControls">
+  <documentManagement>
+    <Status xmlns="71af3243-3dd4-4a8d-8c0d-dd76da1f02a5">Not started</Status>
+    <MediaServiceKeyPoints xmlns="71af3243-3dd4-4a8d-8c0d-dd76da1f02a5" xsi:nil="true"/>
+  </documentManagement>
+</p:properties>
 </file>
 
 <file path=customXml/itemProps1.xml><?xml version="1.0" encoding="utf-8"?>
-<ds:datastoreItem xmlns:ds="http://schemas.openxmlformats.org/officeDocument/2006/customXml" ds:itemID="{99D08CD0-82A3-4566-9B63-BB91B2D89764}">
+<ds:datastoreItem xmlns:ds="http://schemas.openxmlformats.org/officeDocument/2006/customXml" ds:itemID="{F979E8A1-055A-4751-97E9-E6B1F9E21214}">
   <ds:schemaRefs>
-    <ds:schemaRef ds:uri="http://schemas.microsoft.com/office/2006/metadata/properties"/>
-    <ds:schemaRef ds:uri="http://schemas.microsoft.com/office/infopath/2007/PartnerControls"/>
-    <ds:schemaRef ds:uri="71af3243-3dd4-4a8d-8c0d-dd76da1f02a5"/>
+    <ds:schemaRef ds:uri="http://schemas.microsoft.com/sharepoint/v3/contenttype/forms"/>
   </ds:schemaRefs>
 </ds:datastoreItem>
 </file>
@@ -12820,9 +12869,11 @@
 </file>
 
 <file path=customXml/itemProps3.xml><?xml version="1.0" encoding="utf-8"?>
-<ds:datastoreItem xmlns:ds="http://schemas.openxmlformats.org/officeDocument/2006/customXml" ds:itemID="{F979E8A1-055A-4751-97E9-E6B1F9E21214}">
+<ds:datastoreItem xmlns:ds="http://schemas.openxmlformats.org/officeDocument/2006/customXml" ds:itemID="{99D08CD0-82A3-4566-9B63-BB91B2D89764}">
   <ds:schemaRefs>
-    <ds:schemaRef ds:uri="http://schemas.microsoft.com/sharepoint/v3/contenttype/forms"/>
+    <ds:schemaRef ds:uri="http://schemas.microsoft.com/office/2006/metadata/properties"/>
+    <ds:schemaRef ds:uri="http://schemas.microsoft.com/office/infopath/2007/PartnerControls"/>
+    <ds:schemaRef ds:uri="71af3243-3dd4-4a8d-8c0d-dd76da1f02a5"/>
   </ds:schemaRefs>
 </ds:datastoreItem>
 </file>

</xml_diff>